<commit_message>
Added links to main README
</commit_message>
<xml_diff>
--- a/presentations/Fundamental Big Data Analysis & Science - Data science vs Data analytics.pptx
+++ b/presentations/Fundamental Big Data Analysis & Science - Data science vs Data analytics.pptx
@@ -108,6 +108,11 @@
       </a:defRPr>
     </a:lvl9pPr>
   </p:defaultTextStyle>
+  <p:extLst>
+    <p:ext uri="{EFAFB233-063F-42B5-8137-9DF3F51BA10A}">
+      <p15:sldGuideLst xmlns:p15="http://schemas.microsoft.com/office/powerpoint/2012/main"/>
+    </p:ext>
+  </p:extLst>
 </p:presentation>
 </file>
 
@@ -5893,8 +5898,12 @@
           <a:lstStyle/>
           <a:p>
             <a:r>
+              <a:rPr lang="en-US"/>
+              <a:t>Data </a:t>
+            </a:r>
+            <a:r>
               <a:rPr lang="en-US" dirty="0"/>
-              <a:t>Day 1 – Data Science vs Data Analytics</a:t>
+              <a:t>Science vs Data Analytics</a:t>
             </a:r>
             <a:endParaRPr lang="nl-NL" dirty="0"/>
           </a:p>
@@ -6061,10 +6070,48 @@
         </p:nvSpPr>
         <p:spPr/>
         <p:txBody>
-          <a:bodyPr/>
-          <a:lstStyle/>
-          <a:p>
-            <a:endParaRPr lang="nl-NL"/>
+          <a:bodyPr>
+            <a:normAutofit fontScale="85000" lnSpcReduction="20000"/>
+          </a:bodyPr>
+          <a:lstStyle/>
+          <a:p>
+            <a:r>
+              <a:rPr lang="en-US" dirty="0"/>
+              <a:t>Asking questions (formulating hypothesis), answers to which solve known problems or unearth unknown solutions that in turn drive business value,</a:t>
+            </a:r>
+          </a:p>
+          <a:p>
+            <a:r>
+              <a:rPr lang="en-US" dirty="0"/>
+              <a:t>Defining the data needed or working with an existing data set and employing tools (computer science based) to collect, store and explore such data generally in huge volume &amp; variety (often more than 1 TB and 1000s of dimensions),</a:t>
+            </a:r>
+          </a:p>
+          <a:p>
+            <a:r>
+              <a:rPr lang="en-US" dirty="0"/>
+              <a:t>Identifying the type of analysis to be done to get to the answers and performing such analysis by implementing various algorithms/tools (statistics based), often in a distributed and parallel architecture,</a:t>
+            </a:r>
+          </a:p>
+          <a:p>
+            <a:r>
+              <a:rPr lang="en-US" dirty="0"/>
+              <a:t>Communicating the insights gathered from the analysis in the form of simple stories/visualizations/dashboards (the Data Product) that a non-data scientist can understand and build conversation out of it. (It should be kept in mind that a product can also be an piece of code that is internal to a company and is used by various departments. The presentation, maintenance, scalability, </a:t>
+            </a:r>
+            <a:r>
+              <a:rPr lang="en-US" dirty="0" err="1"/>
+              <a:t>etc</a:t>
+            </a:r>
+            <a:r>
+              <a:rPr lang="en-US" dirty="0"/>
+              <a:t> of the code are then the product features, which is often not practiced in many organizations)</a:t>
+            </a:r>
+          </a:p>
+          <a:p>
+            <a:r>
+              <a:rPr lang="en-US" dirty="0"/>
+              <a:t>Building a higher level abstraction that does steps 2-3-4 in an autonomous way, analyzing &amp; taking actions on new data as they are fed to the system.</a:t>
+            </a:r>
+            <a:endParaRPr lang="nl-NL" dirty="0"/>
           </a:p>
         </p:txBody>
       </p:sp>

</xml_diff>